<commit_message>
during word document test
</commit_message>
<xml_diff>
--- a/PyEnglishWords_Architecture.pptx
+++ b/PyEnglishWords_Architecture.pptx
@@ -5,7 +5,7 @@
     <p:sldMasterId id="2147483677" r:id="rId1"/>
   </p:sldMasterIdLst>
   <p:notesMasterIdLst>
-    <p:notesMasterId r:id="rId11"/>
+    <p:notesMasterId r:id="rId12"/>
   </p:notesMasterIdLst>
   <p:sldIdLst>
     <p:sldId id="256" r:id="rId2"/>
@@ -17,6 +17,7 @@
     <p:sldId id="265" r:id="rId8"/>
     <p:sldId id="266" r:id="rId9"/>
     <p:sldId id="267" r:id="rId10"/>
+    <p:sldId id="268" r:id="rId11"/>
   </p:sldIdLst>
   <p:sldSz cx="12192000" cy="6858000"/>
   <p:notesSz cx="6858000" cy="9144000"/>
@@ -216,7 +217,7 @@
           <a:p>
             <a:fld id="{46849B9F-3FC8-4995-8999-8868FD111500}" type="datetimeFigureOut">
               <a:rPr lang="ko-KR" altLang="en-US" smtClean="0"/>
-              <a:t>2018-12-06</a:t>
+              <a:t>2018-12-17</a:t>
             </a:fld>
             <a:endParaRPr lang="ko-KR" altLang="en-US"/>
           </a:p>
@@ -1221,6 +1222,104 @@
 </p:notes>
 </file>
 
+<file path=ppt/notesSlides/notesSlide9.xml><?xml version="1.0" encoding="utf-8"?>
+<p:notes xmlns:a="http://schemas.openxmlformats.org/drawingml/2006/main" xmlns:r="http://schemas.openxmlformats.org/officeDocument/2006/relationships" xmlns:p="http://schemas.openxmlformats.org/presentationml/2006/main">
+  <p:cSld>
+    <p:spTree>
+      <p:nvGrpSpPr>
+        <p:cNvPr id="1" name=""/>
+        <p:cNvGrpSpPr/>
+        <p:nvPr/>
+      </p:nvGrpSpPr>
+      <p:grpSpPr>
+        <a:xfrm>
+          <a:off x="0" y="0"/>
+          <a:ext cx="0" cy="0"/>
+          <a:chOff x="0" y="0"/>
+          <a:chExt cx="0" cy="0"/>
+        </a:xfrm>
+      </p:grpSpPr>
+      <p:sp>
+        <p:nvSpPr>
+          <p:cNvPr id="2" name="슬라이드 이미지 개체 틀 1"/>
+          <p:cNvSpPr>
+            <a:spLocks noGrp="1" noRot="1" noChangeAspect="1"/>
+          </p:cNvSpPr>
+          <p:nvPr>
+            <p:ph type="sldImg"/>
+          </p:nvPr>
+        </p:nvSpPr>
+        <p:spPr/>
+      </p:sp>
+      <p:sp>
+        <p:nvSpPr>
+          <p:cNvPr id="3" name="슬라이드 노트 개체 틀 2"/>
+          <p:cNvSpPr>
+            <a:spLocks noGrp="1"/>
+          </p:cNvSpPr>
+          <p:nvPr>
+            <p:ph type="body" idx="1"/>
+          </p:nvPr>
+        </p:nvSpPr>
+        <p:spPr/>
+        <p:txBody>
+          <a:bodyPr/>
+          <a:lstStyle/>
+          <a:p>
+            <a:r>
+              <a:rPr lang="en-US" altLang="ko-KR" dirty="0"/>
+              <a:t>As Game main screen it will be showing just like example image at the left up corner of center screen and sentence typing area will be right under the sentence showing</a:t>
+            </a:r>
+          </a:p>
+          <a:p>
+            <a:r>
+              <a:rPr lang="en-US" altLang="ko-KR" dirty="0"/>
+              <a:t>Score related succeed or fail will be right </a:t>
+            </a:r>
+            <a:r>
+              <a:rPr lang="en-US" altLang="ko-KR"/>
+              <a:t>up side.  </a:t>
+            </a:r>
+            <a:endParaRPr lang="ko-KR" altLang="en-US" dirty="0"/>
+          </a:p>
+        </p:txBody>
+      </p:sp>
+      <p:sp>
+        <p:nvSpPr>
+          <p:cNvPr id="4" name="슬라이드 번호 개체 틀 3"/>
+          <p:cNvSpPr>
+            <a:spLocks noGrp="1"/>
+          </p:cNvSpPr>
+          <p:nvPr>
+            <p:ph type="sldNum" sz="quarter" idx="5"/>
+          </p:nvPr>
+        </p:nvSpPr>
+        <p:spPr/>
+        <p:txBody>
+          <a:bodyPr/>
+          <a:lstStyle/>
+          <a:p>
+            <a:fld id="{E80DFE8A-FB2D-4278-B5D4-2DEE5CE77A94}" type="slidenum">
+              <a:rPr lang="ko-KR" altLang="en-US" smtClean="0"/>
+              <a:t>10</a:t>
+            </a:fld>
+            <a:endParaRPr lang="ko-KR" altLang="en-US"/>
+          </a:p>
+        </p:txBody>
+      </p:sp>
+    </p:spTree>
+    <p:extLst>
+      <p:ext uri="{BB962C8B-B14F-4D97-AF65-F5344CB8AC3E}">
+        <p14:creationId xmlns:p14="http://schemas.microsoft.com/office/powerpoint/2010/main" val="860223336"/>
+      </p:ext>
+    </p:extLst>
+  </p:cSld>
+  <p:clrMapOvr>
+    <a:masterClrMapping/>
+  </p:clrMapOvr>
+</p:notes>
+</file>
+
 <file path=ppt/slideLayouts/slideLayout1.xml><?xml version="1.0" encoding="utf-8"?>
 <p:sldLayout xmlns:a="http://schemas.openxmlformats.org/drawingml/2006/main" xmlns:r="http://schemas.openxmlformats.org/officeDocument/2006/relationships" xmlns:p="http://schemas.openxmlformats.org/presentationml/2006/main" type="title" preserve="1">
   <p:cSld name="제목 슬라이드">
@@ -1434,7 +1533,7 @@
           <a:p>
             <a:fld id="{B6FC09DB-DA61-4DDD-8259-2BBAB0E1AE87}" type="datetimeFigureOut">
               <a:rPr lang="ko-KR" altLang="en-US" smtClean="0"/>
-              <a:t>2018-12-06</a:t>
+              <a:t>2018-12-17</a:t>
             </a:fld>
             <a:endParaRPr lang="ko-KR" altLang="en-US"/>
           </a:p>
@@ -1725,7 +1824,7 @@
           <a:p>
             <a:fld id="{B6FC09DB-DA61-4DDD-8259-2BBAB0E1AE87}" type="datetimeFigureOut">
               <a:rPr lang="ko-KR" altLang="en-US" smtClean="0"/>
-              <a:t>2018-12-06</a:t>
+              <a:t>2018-12-17</a:t>
             </a:fld>
             <a:endParaRPr lang="ko-KR" altLang="en-US"/>
           </a:p>
@@ -1984,7 +2083,7 @@
           <a:p>
             <a:fld id="{B6FC09DB-DA61-4DDD-8259-2BBAB0E1AE87}" type="datetimeFigureOut">
               <a:rPr lang="ko-KR" altLang="en-US" smtClean="0"/>
-              <a:t>2018-12-06</a:t>
+              <a:t>2018-12-17</a:t>
             </a:fld>
             <a:endParaRPr lang="ko-KR" altLang="en-US"/>
           </a:p>
@@ -2453,7 +2552,7 @@
           <a:p>
             <a:fld id="{B6FC09DB-DA61-4DDD-8259-2BBAB0E1AE87}" type="datetimeFigureOut">
               <a:rPr lang="ko-KR" altLang="en-US" smtClean="0"/>
-              <a:t>2018-12-06</a:t>
+              <a:t>2018-12-17</a:t>
             </a:fld>
             <a:endParaRPr lang="ko-KR" altLang="en-US"/>
           </a:p>
@@ -2633,7 +2732,7 @@
           <a:p>
             <a:fld id="{B6FC09DB-DA61-4DDD-8259-2BBAB0E1AE87}" type="datetimeFigureOut">
               <a:rPr lang="ko-KR" altLang="en-US" smtClean="0"/>
-              <a:t>2018-12-06</a:t>
+              <a:t>2018-12-17</a:t>
             </a:fld>
             <a:endParaRPr lang="ko-KR" altLang="en-US"/>
           </a:p>
@@ -3209,7 +3308,7 @@
           <a:p>
             <a:fld id="{B6FC09DB-DA61-4DDD-8259-2BBAB0E1AE87}" type="datetimeFigureOut">
               <a:rPr lang="ko-KR" altLang="en-US" smtClean="0"/>
-              <a:t>2018-12-06</a:t>
+              <a:t>2018-12-17</a:t>
             </a:fld>
             <a:endParaRPr lang="ko-KR" altLang="en-US"/>
           </a:p>
@@ -3541,7 +3640,7 @@
           <a:p>
             <a:fld id="{B6FC09DB-DA61-4DDD-8259-2BBAB0E1AE87}" type="datetimeFigureOut">
               <a:rPr lang="ko-KR" altLang="en-US" smtClean="0"/>
-              <a:t>2018-12-06</a:t>
+              <a:t>2018-12-17</a:t>
             </a:fld>
             <a:endParaRPr lang="ko-KR" altLang="en-US"/>
           </a:p>
@@ -3716,7 +3815,7 @@
           <a:p>
             <a:fld id="{B6FC09DB-DA61-4DDD-8259-2BBAB0E1AE87}" type="datetimeFigureOut">
               <a:rPr lang="ko-KR" altLang="en-US" smtClean="0"/>
-              <a:t>2018-12-06</a:t>
+              <a:t>2018-12-17</a:t>
             </a:fld>
             <a:endParaRPr lang="ko-KR" altLang="en-US"/>
           </a:p>
@@ -3896,7 +3995,7 @@
           <a:p>
             <a:fld id="{B6FC09DB-DA61-4DDD-8259-2BBAB0E1AE87}" type="datetimeFigureOut">
               <a:rPr lang="ko-KR" altLang="en-US" smtClean="0"/>
-              <a:t>2018-12-06</a:t>
+              <a:t>2018-12-17</a:t>
             </a:fld>
             <a:endParaRPr lang="ko-KR" altLang="en-US"/>
           </a:p>
@@ -4066,7 +4165,7 @@
           <a:p>
             <a:fld id="{B6FC09DB-DA61-4DDD-8259-2BBAB0E1AE87}" type="datetimeFigureOut">
               <a:rPr lang="ko-KR" altLang="en-US" smtClean="0"/>
-              <a:t>2018-12-06</a:t>
+              <a:t>2018-12-17</a:t>
             </a:fld>
             <a:endParaRPr lang="ko-KR" altLang="en-US"/>
           </a:p>
@@ -4323,7 +4422,7 @@
           <a:p>
             <a:fld id="{B6FC09DB-DA61-4DDD-8259-2BBAB0E1AE87}" type="datetimeFigureOut">
               <a:rPr lang="ko-KR" altLang="en-US" smtClean="0"/>
-              <a:t>2018-12-06</a:t>
+              <a:t>2018-12-17</a:t>
             </a:fld>
             <a:endParaRPr lang="ko-KR" altLang="en-US"/>
           </a:p>
@@ -4615,7 +4714,7 @@
           <a:p>
             <a:fld id="{B6FC09DB-DA61-4DDD-8259-2BBAB0E1AE87}" type="datetimeFigureOut">
               <a:rPr lang="ko-KR" altLang="en-US" smtClean="0"/>
-              <a:t>2018-12-06</a:t>
+              <a:t>2018-12-17</a:t>
             </a:fld>
             <a:endParaRPr lang="ko-KR" altLang="en-US"/>
           </a:p>
@@ -5045,7 +5144,7 @@
           <a:p>
             <a:fld id="{B6FC09DB-DA61-4DDD-8259-2BBAB0E1AE87}" type="datetimeFigureOut">
               <a:rPr lang="ko-KR" altLang="en-US" smtClean="0"/>
-              <a:t>2018-12-06</a:t>
+              <a:t>2018-12-17</a:t>
             </a:fld>
             <a:endParaRPr lang="ko-KR" altLang="en-US"/>
           </a:p>
@@ -5163,7 +5262,7 @@
           <a:p>
             <a:fld id="{B6FC09DB-DA61-4DDD-8259-2BBAB0E1AE87}" type="datetimeFigureOut">
               <a:rPr lang="ko-KR" altLang="en-US" smtClean="0"/>
-              <a:t>2018-12-06</a:t>
+              <a:t>2018-12-17</a:t>
             </a:fld>
             <a:endParaRPr lang="ko-KR" altLang="en-US"/>
           </a:p>
@@ -5258,7 +5357,7 @@
           <a:p>
             <a:fld id="{B6FC09DB-DA61-4DDD-8259-2BBAB0E1AE87}" type="datetimeFigureOut">
               <a:rPr lang="ko-KR" altLang="en-US" smtClean="0"/>
-              <a:t>2018-12-06</a:t>
+              <a:t>2018-12-17</a:t>
             </a:fld>
             <a:endParaRPr lang="ko-KR" altLang="en-US"/>
           </a:p>
@@ -5541,7 +5640,7 @@
           <a:p>
             <a:fld id="{B6FC09DB-DA61-4DDD-8259-2BBAB0E1AE87}" type="datetimeFigureOut">
               <a:rPr lang="ko-KR" altLang="en-US" smtClean="0"/>
-              <a:t>2018-12-06</a:t>
+              <a:t>2018-12-17</a:t>
             </a:fld>
             <a:endParaRPr lang="ko-KR" altLang="en-US"/>
           </a:p>
@@ -5832,7 +5931,7 @@
           <a:p>
             <a:fld id="{B6FC09DB-DA61-4DDD-8259-2BBAB0E1AE87}" type="datetimeFigureOut">
               <a:rPr lang="ko-KR" altLang="en-US" smtClean="0"/>
-              <a:t>2018-12-06</a:t>
+              <a:t>2018-12-17</a:t>
             </a:fld>
             <a:endParaRPr lang="ko-KR" altLang="en-US"/>
           </a:p>
@@ -6063,7 +6162,7 @@
           <a:p>
             <a:fld id="{B6FC09DB-DA61-4DDD-8259-2BBAB0E1AE87}" type="datetimeFigureOut">
               <a:rPr lang="ko-KR" altLang="en-US" smtClean="0"/>
-              <a:t>2018-12-06</a:t>
+              <a:t>2018-12-17</a:t>
             </a:fld>
             <a:endParaRPr lang="ko-KR" altLang="en-US"/>
           </a:p>
@@ -7083,6 +7182,430 @@
 </p:sld>
 </file>
 
+<file path=ppt/slides/slide10.xml><?xml version="1.0" encoding="utf-8"?>
+<p:sld xmlns:a="http://schemas.openxmlformats.org/drawingml/2006/main" xmlns:r="http://schemas.openxmlformats.org/officeDocument/2006/relationships" xmlns:p="http://schemas.openxmlformats.org/presentationml/2006/main">
+  <p:cSld>
+    <p:spTree>
+      <p:nvGrpSpPr>
+        <p:cNvPr id="1" name=""/>
+        <p:cNvGrpSpPr/>
+        <p:nvPr/>
+      </p:nvGrpSpPr>
+      <p:grpSpPr>
+        <a:xfrm>
+          <a:off x="0" y="0"/>
+          <a:ext cx="0" cy="0"/>
+          <a:chOff x="0" y="0"/>
+          <a:chExt cx="0" cy="0"/>
+        </a:xfrm>
+      </p:grpSpPr>
+      <p:sp>
+        <p:nvSpPr>
+          <p:cNvPr id="5" name="직사각형 4">
+            <a:extLst>
+              <a:ext uri="{FF2B5EF4-FFF2-40B4-BE49-F238E27FC236}">
+                <a16:creationId xmlns:a16="http://schemas.microsoft.com/office/drawing/2014/main" id="{788D2D24-3E78-4CA8-A386-B96B96FC3C08}"/>
+              </a:ext>
+            </a:extLst>
+          </p:cNvPr>
+          <p:cNvSpPr/>
+          <p:nvPr/>
+        </p:nvSpPr>
+        <p:spPr>
+          <a:xfrm>
+            <a:off x="3205213" y="0"/>
+            <a:ext cx="8986787" cy="6858000"/>
+          </a:xfrm>
+          <a:prstGeom prst="rect">
+            <a:avLst/>
+          </a:prstGeom>
+          <a:solidFill>
+            <a:schemeClr val="accent1">
+              <a:lumMod val="40000"/>
+              <a:lumOff val="60000"/>
+            </a:schemeClr>
+          </a:solidFill>
+        </p:spPr>
+        <p:style>
+          <a:lnRef idx="2">
+            <a:schemeClr val="accent1">
+              <a:shade val="50000"/>
+            </a:schemeClr>
+          </a:lnRef>
+          <a:fillRef idx="1">
+            <a:schemeClr val="accent1"/>
+          </a:fillRef>
+          <a:effectRef idx="0">
+            <a:schemeClr val="accent1"/>
+          </a:effectRef>
+          <a:fontRef idx="minor">
+            <a:schemeClr val="lt1"/>
+          </a:fontRef>
+        </p:style>
+        <p:txBody>
+          <a:bodyPr rtlCol="0" anchor="ctr"/>
+          <a:lstStyle/>
+          <a:p>
+            <a:endParaRPr lang="en-US" altLang="ko-KR" dirty="0"/>
+          </a:p>
+          <a:p>
+            <a:pPr algn="ctr"/>
+            <a:endParaRPr lang="en-US" altLang="ko-KR" dirty="0"/>
+          </a:p>
+          <a:p>
+            <a:pPr algn="ctr"/>
+            <a:endParaRPr lang="ko-KR" altLang="en-US" dirty="0"/>
+          </a:p>
+        </p:txBody>
+      </p:sp>
+      <p:sp>
+        <p:nvSpPr>
+          <p:cNvPr id="7" name="직사각형 6">
+            <a:extLst>
+              <a:ext uri="{FF2B5EF4-FFF2-40B4-BE49-F238E27FC236}">
+                <a16:creationId xmlns:a16="http://schemas.microsoft.com/office/drawing/2014/main" id="{3EA9033E-AE73-4A8F-B45F-FD55B3342929}"/>
+              </a:ext>
+            </a:extLst>
+          </p:cNvPr>
+          <p:cNvSpPr/>
+          <p:nvPr/>
+        </p:nvSpPr>
+        <p:spPr>
+          <a:xfrm>
+            <a:off x="107890" y="1234632"/>
+            <a:ext cx="2459328" cy="1015663"/>
+          </a:xfrm>
+          <a:prstGeom prst="rect">
+            <a:avLst/>
+          </a:prstGeom>
+          <a:noFill/>
+        </p:spPr>
+        <p:txBody>
+          <a:bodyPr wrap="none" lIns="91440" tIns="45720" rIns="91440" bIns="45720">
+            <a:spAutoFit/>
+          </a:bodyPr>
+          <a:lstStyle/>
+          <a:p>
+            <a:r>
+              <a:rPr lang="en-US" altLang="ko-KR" sz="2000" b="1" cap="none" spc="0" dirty="0">
+                <a:ln w="12700">
+                  <a:solidFill>
+                    <a:schemeClr val="tx2">
+                      <a:lumMod val="75000"/>
+                    </a:schemeClr>
+                  </a:solidFill>
+                  <a:prstDash val="solid"/>
+                </a:ln>
+                <a:pattFill prst="dkUpDiag">
+                  <a:fgClr>
+                    <a:schemeClr val="tx2"/>
+                  </a:fgClr>
+                  <a:bgClr>
+                    <a:schemeClr val="tx2">
+                      <a:lumMod val="20000"/>
+                      <a:lumOff val="80000"/>
+                    </a:schemeClr>
+                  </a:bgClr>
+                </a:pattFill>
+                <a:effectLst>
+                  <a:outerShdw dist="38100" dir="2640000" algn="bl" rotWithShape="0">
+                    <a:schemeClr val="tx2">
+                      <a:lumMod val="75000"/>
+                    </a:schemeClr>
+                  </a:outerShdw>
+                </a:effectLst>
+              </a:rPr>
+              <a:t>003.</a:t>
+            </a:r>
+          </a:p>
+          <a:p>
+            <a:r>
+              <a:rPr lang="en-US" altLang="ko-KR" sz="2000" b="1" dirty="0">
+                <a:ln w="12700">
+                  <a:solidFill>
+                    <a:schemeClr val="tx2">
+                      <a:lumMod val="75000"/>
+                    </a:schemeClr>
+                  </a:solidFill>
+                  <a:prstDash val="solid"/>
+                </a:ln>
+                <a:pattFill prst="dkUpDiag">
+                  <a:fgClr>
+                    <a:schemeClr val="tx2"/>
+                  </a:fgClr>
+                  <a:bgClr>
+                    <a:schemeClr val="tx2">
+                      <a:lumMod val="20000"/>
+                      <a:lumOff val="80000"/>
+                    </a:schemeClr>
+                  </a:bgClr>
+                </a:pattFill>
+                <a:effectLst>
+                  <a:outerShdw dist="38100" dir="2640000" algn="bl" rotWithShape="0">
+                    <a:schemeClr val="tx2">
+                      <a:lumMod val="75000"/>
+                    </a:schemeClr>
+                  </a:outerShdw>
+                </a:effectLst>
+              </a:rPr>
+              <a:t>Each Menu Action</a:t>
+            </a:r>
+          </a:p>
+          <a:p>
+            <a:endParaRPr lang="en-US" altLang="ko-KR" sz="2000" b="1" cap="none" spc="0" dirty="0">
+              <a:ln w="12700">
+                <a:solidFill>
+                  <a:schemeClr val="tx2">
+                    <a:lumMod val="75000"/>
+                  </a:schemeClr>
+                </a:solidFill>
+                <a:prstDash val="solid"/>
+              </a:ln>
+              <a:pattFill prst="dkUpDiag">
+                <a:fgClr>
+                  <a:schemeClr val="tx2"/>
+                </a:fgClr>
+                <a:bgClr>
+                  <a:schemeClr val="tx2">
+                    <a:lumMod val="20000"/>
+                    <a:lumOff val="80000"/>
+                  </a:schemeClr>
+                </a:bgClr>
+              </a:pattFill>
+              <a:effectLst>
+                <a:outerShdw dist="38100" dir="2640000" algn="bl" rotWithShape="0">
+                  <a:schemeClr val="tx2">
+                    <a:lumMod val="75000"/>
+                  </a:schemeClr>
+                </a:outerShdw>
+              </a:effectLst>
+            </a:endParaRPr>
+          </a:p>
+        </p:txBody>
+      </p:sp>
+      <p:sp>
+        <p:nvSpPr>
+          <p:cNvPr id="4" name="직사각형 3">
+            <a:extLst>
+              <a:ext uri="{FF2B5EF4-FFF2-40B4-BE49-F238E27FC236}">
+                <a16:creationId xmlns:a16="http://schemas.microsoft.com/office/drawing/2014/main" id="{61FBCCEA-12A0-4BBA-A597-8A51BB13109C}"/>
+              </a:ext>
+            </a:extLst>
+          </p:cNvPr>
+          <p:cNvSpPr/>
+          <p:nvPr/>
+        </p:nvSpPr>
+        <p:spPr>
+          <a:xfrm>
+            <a:off x="3745734" y="495759"/>
+            <a:ext cx="1266939" cy="330506"/>
+          </a:xfrm>
+          <a:prstGeom prst="rect">
+            <a:avLst/>
+          </a:prstGeom>
+        </p:spPr>
+        <p:style>
+          <a:lnRef idx="2">
+            <a:schemeClr val="accent1">
+              <a:shade val="50000"/>
+            </a:schemeClr>
+          </a:lnRef>
+          <a:fillRef idx="1">
+            <a:schemeClr val="accent1"/>
+          </a:fillRef>
+          <a:effectRef idx="0">
+            <a:schemeClr val="accent1"/>
+          </a:effectRef>
+          <a:fontRef idx="minor">
+            <a:schemeClr val="lt1"/>
+          </a:fontRef>
+        </p:style>
+        <p:txBody>
+          <a:bodyPr rtlCol="0" anchor="ctr"/>
+          <a:lstStyle/>
+          <a:p>
+            <a:pPr algn="ctr"/>
+            <a:r>
+              <a:rPr lang="en-US" altLang="ko-KR" dirty="0"/>
+              <a:t>Exit</a:t>
+            </a:r>
+            <a:endParaRPr lang="ko-KR" altLang="en-US" dirty="0"/>
+          </a:p>
+        </p:txBody>
+      </p:sp>
+      <p:sp>
+        <p:nvSpPr>
+          <p:cNvPr id="8" name="직사각형 7">
+            <a:extLst>
+              <a:ext uri="{FF2B5EF4-FFF2-40B4-BE49-F238E27FC236}">
+                <a16:creationId xmlns:a16="http://schemas.microsoft.com/office/drawing/2014/main" id="{36C920A2-F0F7-484F-AE77-FBC7297AFF66}"/>
+              </a:ext>
+            </a:extLst>
+          </p:cNvPr>
+          <p:cNvSpPr/>
+          <p:nvPr/>
+        </p:nvSpPr>
+        <p:spPr>
+          <a:xfrm>
+            <a:off x="3745735" y="1015663"/>
+            <a:ext cx="1266940" cy="769070"/>
+          </a:xfrm>
+          <a:prstGeom prst="rect">
+            <a:avLst/>
+          </a:prstGeom>
+        </p:spPr>
+        <p:style>
+          <a:lnRef idx="2">
+            <a:schemeClr val="accent1">
+              <a:shade val="50000"/>
+            </a:schemeClr>
+          </a:lnRef>
+          <a:fillRef idx="1">
+            <a:schemeClr val="accent1"/>
+          </a:fillRef>
+          <a:effectRef idx="0">
+            <a:schemeClr val="accent1"/>
+          </a:effectRef>
+          <a:fontRef idx="minor">
+            <a:schemeClr val="lt1"/>
+          </a:fontRef>
+        </p:style>
+        <p:txBody>
+          <a:bodyPr rtlCol="0" anchor="ctr"/>
+          <a:lstStyle/>
+          <a:p>
+            <a:pPr algn="ctr"/>
+            <a:r>
+              <a:rPr lang="en-US" altLang="ko-KR" dirty="0"/>
+              <a:t>Exit</a:t>
+            </a:r>
+          </a:p>
+          <a:p>
+            <a:pPr algn="ctr"/>
+            <a:r>
+              <a:rPr lang="en-US" altLang="ko-KR" dirty="0"/>
+              <a:t>toolbar</a:t>
+            </a:r>
+            <a:endParaRPr lang="ko-KR" altLang="en-US" dirty="0"/>
+          </a:p>
+        </p:txBody>
+      </p:sp>
+      <p:sp>
+        <p:nvSpPr>
+          <p:cNvPr id="10" name="화살표: 톱니 모양의 오른쪽 9">
+            <a:extLst>
+              <a:ext uri="{FF2B5EF4-FFF2-40B4-BE49-F238E27FC236}">
+                <a16:creationId xmlns:a16="http://schemas.microsoft.com/office/drawing/2014/main" id="{95386EB8-E5AE-49E3-A051-470F4082B596}"/>
+              </a:ext>
+            </a:extLst>
+          </p:cNvPr>
+          <p:cNvSpPr/>
+          <p:nvPr/>
+        </p:nvSpPr>
+        <p:spPr>
+          <a:xfrm>
+            <a:off x="5664541" y="826265"/>
+            <a:ext cx="989647" cy="408367"/>
+          </a:xfrm>
+          <a:prstGeom prst="notchedRightArrow">
+            <a:avLst/>
+          </a:prstGeom>
+        </p:spPr>
+        <p:style>
+          <a:lnRef idx="2">
+            <a:schemeClr val="accent1">
+              <a:shade val="50000"/>
+            </a:schemeClr>
+          </a:lnRef>
+          <a:fillRef idx="1">
+            <a:schemeClr val="accent1"/>
+          </a:fillRef>
+          <a:effectRef idx="0">
+            <a:schemeClr val="accent1"/>
+          </a:effectRef>
+          <a:fontRef idx="minor">
+            <a:schemeClr val="lt1"/>
+          </a:fontRef>
+        </p:style>
+        <p:txBody>
+          <a:bodyPr rtlCol="0" anchor="ctr"/>
+          <a:lstStyle/>
+          <a:p>
+            <a:pPr algn="ctr"/>
+            <a:endParaRPr lang="ko-KR" altLang="en-US"/>
+          </a:p>
+        </p:txBody>
+      </p:sp>
+      <p:sp>
+        <p:nvSpPr>
+          <p:cNvPr id="11" name="직사각형 10">
+            <a:extLst>
+              <a:ext uri="{FF2B5EF4-FFF2-40B4-BE49-F238E27FC236}">
+                <a16:creationId xmlns:a16="http://schemas.microsoft.com/office/drawing/2014/main" id="{617A4C8F-8B05-4FF8-9BA6-DE08E7189017}"/>
+              </a:ext>
+            </a:extLst>
+          </p:cNvPr>
+          <p:cNvSpPr/>
+          <p:nvPr/>
+        </p:nvSpPr>
+        <p:spPr>
+          <a:xfrm>
+            <a:off x="7028761" y="495759"/>
+            <a:ext cx="2500829" cy="1288974"/>
+          </a:xfrm>
+          <a:prstGeom prst="rect">
+            <a:avLst/>
+          </a:prstGeom>
+        </p:spPr>
+        <p:style>
+          <a:lnRef idx="2">
+            <a:schemeClr val="accent1">
+              <a:shade val="50000"/>
+            </a:schemeClr>
+          </a:lnRef>
+          <a:fillRef idx="1">
+            <a:schemeClr val="accent1"/>
+          </a:fillRef>
+          <a:effectRef idx="0">
+            <a:schemeClr val="accent1"/>
+          </a:effectRef>
+          <a:fontRef idx="minor">
+            <a:schemeClr val="lt1"/>
+          </a:fontRef>
+        </p:style>
+        <p:txBody>
+          <a:bodyPr rtlCol="0" anchor="ctr"/>
+          <a:lstStyle/>
+          <a:p>
+            <a:pPr algn="ctr"/>
+            <a:r>
+              <a:rPr lang="en-US" altLang="ko-KR" dirty="0"/>
+              <a:t>Application </a:t>
+            </a:r>
+          </a:p>
+          <a:p>
+            <a:pPr algn="ctr"/>
+            <a:r>
+              <a:rPr lang="en-US" altLang="ko-KR" dirty="0"/>
+              <a:t>Exit</a:t>
+            </a:r>
+            <a:endParaRPr lang="ko-KR" altLang="en-US" dirty="0"/>
+          </a:p>
+        </p:txBody>
+      </p:sp>
+    </p:spTree>
+    <p:extLst>
+      <p:ext uri="{BB962C8B-B14F-4D97-AF65-F5344CB8AC3E}">
+        <p14:creationId xmlns:p14="http://schemas.microsoft.com/office/powerpoint/2010/main" val="759916140"/>
+      </p:ext>
+    </p:extLst>
+  </p:cSld>
+  <p:clrMapOvr>
+    <a:masterClrMapping/>
+  </p:clrMapOvr>
+</p:sld>
+</file>
+
 <file path=ppt/slides/slide2.xml><?xml version="1.0" encoding="utf-8"?>
 <p:sld xmlns:a="http://schemas.openxmlformats.org/drawingml/2006/main" xmlns:r="http://schemas.openxmlformats.org/officeDocument/2006/relationships" xmlns:p="http://schemas.openxmlformats.org/presentationml/2006/main">
   <p:cSld>
@@ -7162,9 +7685,6 @@
             </a:r>
           </a:p>
           <a:p>
-            <a:endParaRPr lang="en-US" altLang="ko-KR" dirty="0"/>
-          </a:p>
-          <a:p>
             <a:r>
               <a:rPr lang="en-US" altLang="ko-KR" dirty="0"/>
               <a:t>002. Sub Window Design</a:t>
@@ -7195,21 +7715,21 @@
             </a:r>
           </a:p>
           <a:p>
-            <a:endParaRPr lang="en-US" altLang="ko-KR" dirty="0"/>
-          </a:p>
-          <a:p>
             <a:r>
               <a:rPr lang="en-US" altLang="ko-KR" dirty="0"/>
               <a:t>003. Software architecture</a:t>
             </a:r>
           </a:p>
           <a:p>
-            <a:endParaRPr lang="en-US" altLang="ko-KR" dirty="0"/>
-          </a:p>
-          <a:p>
             <a:r>
               <a:rPr lang="en-US" altLang="ko-KR" dirty="0"/>
-              <a:t>003. Contents</a:t>
+              <a:t>004. Menu action</a:t>
+            </a:r>
+          </a:p>
+          <a:p>
+            <a:r>
+              <a:rPr lang="en-US" altLang="ko-KR" dirty="0"/>
+              <a:t>004. Contents</a:t>
             </a:r>
           </a:p>
           <a:p>
@@ -8530,7 +9050,7 @@
         </p:nvSpPr>
         <p:spPr>
           <a:xfrm>
-            <a:off x="3951668" y="792206"/>
+            <a:off x="3951668" y="1325870"/>
             <a:ext cx="2144332" cy="264017"/>
           </a:xfrm>
           <a:prstGeom prst="rect">
@@ -8577,15 +9097,14 @@
           </p:cNvPr>
           <p:cNvCxnSpPr>
             <a:cxnSpLocks/>
-            <a:stCxn id="3" idx="2"/>
             <a:endCxn id="6" idx="1"/>
           </p:cNvCxnSpPr>
           <p:nvPr/>
         </p:nvCxnSpPr>
         <p:spPr>
           <a:xfrm rot="16200000" flipH="1">
-            <a:off x="3732190" y="704736"/>
-            <a:ext cx="292995" cy="145961"/>
+            <a:off x="3627820" y="1134031"/>
+            <a:ext cx="501732" cy="145963"/>
           </a:xfrm>
           <a:prstGeom prst="bentConnector2">
             <a:avLst/>
@@ -8620,7 +9139,7 @@
         </p:nvSpPr>
         <p:spPr>
           <a:xfrm>
-            <a:off x="3951668" y="1215572"/>
+            <a:off x="3951668" y="1749236"/>
             <a:ext cx="2144332" cy="264017"/>
           </a:xfrm>
           <a:prstGeom prst="rect">
@@ -8673,7 +9192,7 @@
         </p:nvCxnSpPr>
         <p:spPr>
           <a:xfrm rot="10800000">
-            <a:off x="3805712" y="924219"/>
+            <a:off x="3805712" y="1457883"/>
             <a:ext cx="145957" cy="423363"/>
           </a:xfrm>
           <a:prstGeom prst="bentConnector2">
@@ -8709,7 +9228,7 @@
         </p:nvSpPr>
         <p:spPr>
           <a:xfrm>
-            <a:off x="3951668" y="1656620"/>
+            <a:off x="3951668" y="2190284"/>
             <a:ext cx="2144332" cy="264017"/>
           </a:xfrm>
           <a:prstGeom prst="rect">
@@ -8761,7 +9280,7 @@
         </p:nvCxnSpPr>
         <p:spPr>
           <a:xfrm rot="10800000">
-            <a:off x="3805708" y="1347583"/>
+            <a:off x="3805708" y="1881247"/>
             <a:ext cx="145961" cy="441047"/>
           </a:xfrm>
           <a:prstGeom prst="bentConnector2">
@@ -8797,7 +9316,7 @@
         </p:nvSpPr>
         <p:spPr>
           <a:xfrm>
-            <a:off x="3951668" y="2097668"/>
+            <a:off x="3951668" y="2631332"/>
             <a:ext cx="2144332" cy="264017"/>
           </a:xfrm>
           <a:prstGeom prst="rect">
@@ -8847,7 +9366,7 @@
         </p:nvSpPr>
         <p:spPr>
           <a:xfrm>
-            <a:off x="3951668" y="2521034"/>
+            <a:off x="3951668" y="3054698"/>
             <a:ext cx="2144332" cy="264017"/>
           </a:xfrm>
           <a:prstGeom prst="rect">
@@ -8900,7 +9419,7 @@
         </p:nvCxnSpPr>
         <p:spPr>
           <a:xfrm rot="10800000">
-            <a:off x="3805712" y="1788633"/>
+            <a:off x="3805712" y="2322297"/>
             <a:ext cx="145957" cy="441045"/>
           </a:xfrm>
           <a:prstGeom prst="bentConnector2">
@@ -8939,7 +9458,7 @@
         </p:nvCxnSpPr>
         <p:spPr>
           <a:xfrm rot="10800000">
-            <a:off x="3805712" y="2229681"/>
+            <a:off x="3805712" y="2763345"/>
             <a:ext cx="145957" cy="423363"/>
           </a:xfrm>
           <a:prstGeom prst="bentConnector2">
@@ -9692,7 +10211,7 @@
         </p:nvSpPr>
         <p:spPr>
           <a:xfrm>
-            <a:off x="3470856" y="3086943"/>
+            <a:off x="3470856" y="4071313"/>
             <a:ext cx="669702" cy="264017"/>
           </a:xfrm>
           <a:prstGeom prst="rect">
@@ -9742,7 +10261,7 @@
         </p:nvSpPr>
         <p:spPr>
           <a:xfrm>
-            <a:off x="3951668" y="3511946"/>
+            <a:off x="3951668" y="4496316"/>
             <a:ext cx="2213032" cy="264017"/>
           </a:xfrm>
           <a:prstGeom prst="rect">
@@ -9792,7 +10311,7 @@
         </p:nvSpPr>
         <p:spPr>
           <a:xfrm>
-            <a:off x="3951667" y="3935312"/>
+            <a:off x="3951667" y="4919682"/>
             <a:ext cx="2213031" cy="264017"/>
           </a:xfrm>
           <a:prstGeom prst="rect">
@@ -9845,7 +10364,7 @@
         </p:nvCxnSpPr>
         <p:spPr>
           <a:xfrm rot="10800000">
-            <a:off x="3805709" y="3643959"/>
+            <a:off x="3805709" y="4628329"/>
             <a:ext cx="145958" cy="423363"/>
           </a:xfrm>
           <a:prstGeom prst="bentConnector2">
@@ -9881,8 +10400,97 @@
         </p:nvCxnSpPr>
         <p:spPr>
           <a:xfrm rot="16200000" flipH="1">
-            <a:off x="3732186" y="3424481"/>
+            <a:off x="3732186" y="4408851"/>
             <a:ext cx="292995" cy="145961"/>
+          </a:xfrm>
+          <a:prstGeom prst="bentConnector2">
+            <a:avLst/>
+          </a:prstGeom>
+        </p:spPr>
+        <p:style>
+          <a:lnRef idx="1">
+            <a:schemeClr val="accent1"/>
+          </a:lnRef>
+          <a:fillRef idx="0">
+            <a:schemeClr val="accent1"/>
+          </a:fillRef>
+          <a:effectRef idx="0">
+            <a:schemeClr val="accent1"/>
+          </a:effectRef>
+          <a:fontRef idx="minor">
+            <a:schemeClr val="tx1"/>
+          </a:fontRef>
+        </p:style>
+      </p:cxnSp>
+      <p:sp>
+        <p:nvSpPr>
+          <p:cNvPr id="36" name="직사각형 35">
+            <a:extLst>
+              <a:ext uri="{FF2B5EF4-FFF2-40B4-BE49-F238E27FC236}">
+                <a16:creationId xmlns:a16="http://schemas.microsoft.com/office/drawing/2014/main" id="{B8D5B421-4646-4827-BE6B-098C0001FBF0}"/>
+              </a:ext>
+            </a:extLst>
+          </p:cNvPr>
+          <p:cNvSpPr/>
+          <p:nvPr/>
+        </p:nvSpPr>
+        <p:spPr>
+          <a:xfrm>
+            <a:off x="3951664" y="874035"/>
+            <a:ext cx="2144332" cy="264017"/>
+          </a:xfrm>
+          <a:prstGeom prst="rect">
+            <a:avLst/>
+          </a:prstGeom>
+        </p:spPr>
+        <p:style>
+          <a:lnRef idx="2">
+            <a:schemeClr val="accent1">
+              <a:shade val="50000"/>
+            </a:schemeClr>
+          </a:lnRef>
+          <a:fillRef idx="1">
+            <a:schemeClr val="accent1"/>
+          </a:fillRef>
+          <a:effectRef idx="0">
+            <a:schemeClr val="accent1"/>
+          </a:effectRef>
+          <a:fontRef idx="minor">
+            <a:schemeClr val="lt1"/>
+          </a:fontRef>
+        </p:style>
+        <p:txBody>
+          <a:bodyPr rtlCol="0" anchor="ctr"/>
+          <a:lstStyle/>
+          <a:p>
+            <a:pPr algn="ctr"/>
+            <a:r>
+              <a:rPr lang="en-US" altLang="ko-KR" sz="1500" dirty="0"/>
+              <a:t>New Ctrl + N</a:t>
+            </a:r>
+            <a:endParaRPr lang="ko-KR" altLang="en-US" sz="1500" dirty="0"/>
+          </a:p>
+        </p:txBody>
+      </p:sp>
+      <p:cxnSp>
+        <p:nvCxnSpPr>
+          <p:cNvPr id="4" name="연결선: 꺾임 3">
+            <a:extLst>
+              <a:ext uri="{FF2B5EF4-FFF2-40B4-BE49-F238E27FC236}">
+                <a16:creationId xmlns:a16="http://schemas.microsoft.com/office/drawing/2014/main" id="{13CA9AA8-FEEA-4EC3-951E-E575F8D1A871}"/>
+              </a:ext>
+            </a:extLst>
+          </p:cNvPr>
+          <p:cNvCxnSpPr>
+            <a:stCxn id="36" idx="1"/>
+            <a:endCxn id="3" idx="2"/>
+          </p:cNvCxnSpPr>
+          <p:nvPr/>
+        </p:nvCxnSpPr>
+        <p:spPr>
+          <a:xfrm rot="10800000">
+            <a:off x="3805708" y="631220"/>
+            <a:ext cx="145957" cy="374824"/>
           </a:xfrm>
           <a:prstGeom prst="bentConnector2">
             <a:avLst/>

</xml_diff>